<commit_message>
WIP -- merging data analysis
</commit_message>
<xml_diff>
--- a/impact of covid on mental health.pptx
+++ b/impact of covid on mental health.pptx
@@ -9,15 +9,16 @@
     <p:sldId id="257" r:id="rId3"/>
     <p:sldId id="258" r:id="rId4"/>
     <p:sldId id="267" r:id="rId5"/>
-    <p:sldId id="268" r:id="rId6"/>
-    <p:sldId id="269" r:id="rId7"/>
-    <p:sldId id="270" r:id="rId8"/>
-    <p:sldId id="271" r:id="rId9"/>
-    <p:sldId id="273" r:id="rId10"/>
-    <p:sldId id="272" r:id="rId11"/>
-    <p:sldId id="274" r:id="rId12"/>
-    <p:sldId id="275" r:id="rId13"/>
-    <p:sldId id="276" r:id="rId14"/>
+    <p:sldId id="269" r:id="rId6"/>
+    <p:sldId id="270" r:id="rId7"/>
+    <p:sldId id="271" r:id="rId8"/>
+    <p:sldId id="277" r:id="rId9"/>
+    <p:sldId id="278" r:id="rId10"/>
+    <p:sldId id="273" r:id="rId11"/>
+    <p:sldId id="272" r:id="rId12"/>
+    <p:sldId id="274" r:id="rId13"/>
+    <p:sldId id="275" r:id="rId14"/>
+    <p:sldId id="276" r:id="rId15"/>
   </p:sldIdLst>
   <p:sldSz cx="12192000" cy="6858000"/>
   <p:notesSz cx="6858000" cy="9144000"/>
@@ -116,6 +117,11 @@
       </a:defRPr>
     </a:lvl9pPr>
   </p:defaultTextStyle>
+  <p:extLst>
+    <p:ext uri="{EFAFB233-063F-42B5-8137-9DF3F51BA10A}">
+      <p15:sldGuideLst xmlns:p15="http://schemas.microsoft.com/office/powerpoint/2012/main"/>
+    </p:ext>
+  </p:extLst>
 </p:presentation>
 </file>
 
@@ -841,7 +847,7 @@
           <a:p>
             <a:fld id="{3ED37A20-15BF-40A6-9394-A94FB503F24D}" type="datetimeFigureOut">
               <a:rPr lang="zh-CN" altLang="en-US" smtClean="0"/>
-              <a:t>2021/4/28</a:t>
+              <a:t>2021/4/29</a:t>
             </a:fld>
             <a:endParaRPr lang="zh-CN" altLang="en-US"/>
           </a:p>
@@ -1092,7 +1098,7 @@
           <a:p>
             <a:fld id="{3ED37A20-15BF-40A6-9394-A94FB503F24D}" type="datetimeFigureOut">
               <a:rPr lang="zh-CN" altLang="en-US" smtClean="0"/>
-              <a:t>2021/4/28</a:t>
+              <a:t>2021/4/29</a:t>
             </a:fld>
             <a:endParaRPr lang="zh-CN" altLang="en-US"/>
           </a:p>
@@ -1406,7 +1412,7 @@
           <a:p>
             <a:fld id="{3ED37A20-15BF-40A6-9394-A94FB503F24D}" type="datetimeFigureOut">
               <a:rPr lang="zh-CN" altLang="en-US" smtClean="0"/>
-              <a:t>2021/4/28</a:t>
+              <a:t>2021/4/29</a:t>
             </a:fld>
             <a:endParaRPr lang="zh-CN" altLang="en-US"/>
           </a:p>
@@ -1747,7 +1753,7 @@
           <a:p>
             <a:fld id="{3ED37A20-15BF-40A6-9394-A94FB503F24D}" type="datetimeFigureOut">
               <a:rPr lang="zh-CN" altLang="en-US" smtClean="0"/>
-              <a:t>2021/4/28</a:t>
+              <a:t>2021/4/29</a:t>
             </a:fld>
             <a:endParaRPr lang="zh-CN" altLang="en-US"/>
           </a:p>
@@ -2061,7 +2067,7 @@
           <a:p>
             <a:fld id="{3ED37A20-15BF-40A6-9394-A94FB503F24D}" type="datetimeFigureOut">
               <a:rPr lang="zh-CN" altLang="en-US" smtClean="0"/>
-              <a:t>2021/4/28</a:t>
+              <a:t>2021/4/29</a:t>
             </a:fld>
             <a:endParaRPr lang="zh-CN" altLang="en-US"/>
           </a:p>
@@ -2454,7 +2460,7 @@
           <a:p>
             <a:fld id="{3ED37A20-15BF-40A6-9394-A94FB503F24D}" type="datetimeFigureOut">
               <a:rPr lang="zh-CN" altLang="en-US" smtClean="0"/>
-              <a:t>2021/4/28</a:t>
+              <a:t>2021/4/29</a:t>
             </a:fld>
             <a:endParaRPr lang="zh-CN" altLang="en-US"/>
           </a:p>
@@ -2624,7 +2630,7 @@
           <a:p>
             <a:fld id="{3ED37A20-15BF-40A6-9394-A94FB503F24D}" type="datetimeFigureOut">
               <a:rPr lang="zh-CN" altLang="en-US" smtClean="0"/>
-              <a:t>2021/4/28</a:t>
+              <a:t>2021/4/29</a:t>
             </a:fld>
             <a:endParaRPr lang="zh-CN" altLang="en-US"/>
           </a:p>
@@ -2804,7 +2810,7 @@
           <a:p>
             <a:fld id="{3ED37A20-15BF-40A6-9394-A94FB503F24D}" type="datetimeFigureOut">
               <a:rPr lang="zh-CN" altLang="en-US" smtClean="0"/>
-              <a:t>2021/4/28</a:t>
+              <a:t>2021/4/29</a:t>
             </a:fld>
             <a:endParaRPr lang="zh-CN" altLang="en-US"/>
           </a:p>
@@ -2980,7 +2986,7 @@
           <a:p>
             <a:fld id="{3ED37A20-15BF-40A6-9394-A94FB503F24D}" type="datetimeFigureOut">
               <a:rPr lang="zh-CN" altLang="en-US" smtClean="0"/>
-              <a:t>2021/4/28</a:t>
+              <a:t>2021/4/29</a:t>
             </a:fld>
             <a:endParaRPr lang="zh-CN" altLang="en-US"/>
           </a:p>
@@ -3227,7 +3233,7 @@
           <a:p>
             <a:fld id="{3ED37A20-15BF-40A6-9394-A94FB503F24D}" type="datetimeFigureOut">
               <a:rPr lang="zh-CN" altLang="en-US" smtClean="0"/>
-              <a:t>2021/4/28</a:t>
+              <a:t>2021/4/29</a:t>
             </a:fld>
             <a:endParaRPr lang="zh-CN" altLang="en-US"/>
           </a:p>
@@ -3459,7 +3465,7 @@
           <a:p>
             <a:fld id="{3ED37A20-15BF-40A6-9394-A94FB503F24D}" type="datetimeFigureOut">
               <a:rPr lang="zh-CN" altLang="en-US" smtClean="0"/>
-              <a:t>2021/4/28</a:t>
+              <a:t>2021/4/29</a:t>
             </a:fld>
             <a:endParaRPr lang="zh-CN" altLang="en-US"/>
           </a:p>
@@ -3833,7 +3839,7 @@
           <a:p>
             <a:fld id="{3ED37A20-15BF-40A6-9394-A94FB503F24D}" type="datetimeFigureOut">
               <a:rPr lang="zh-CN" altLang="en-US" smtClean="0"/>
-              <a:t>2021/4/28</a:t>
+              <a:t>2021/4/29</a:t>
             </a:fld>
             <a:endParaRPr lang="zh-CN" altLang="en-US"/>
           </a:p>
@@ -3956,7 +3962,7 @@
           <a:p>
             <a:fld id="{3ED37A20-15BF-40A6-9394-A94FB503F24D}" type="datetimeFigureOut">
               <a:rPr lang="zh-CN" altLang="en-US" smtClean="0"/>
-              <a:t>2021/4/28</a:t>
+              <a:t>2021/4/29</a:t>
             </a:fld>
             <a:endParaRPr lang="zh-CN" altLang="en-US"/>
           </a:p>
@@ -4051,7 +4057,7 @@
           <a:p>
             <a:fld id="{3ED37A20-15BF-40A6-9394-A94FB503F24D}" type="datetimeFigureOut">
               <a:rPr lang="zh-CN" altLang="en-US" smtClean="0"/>
-              <a:t>2021/4/28</a:t>
+              <a:t>2021/4/29</a:t>
             </a:fld>
             <a:endParaRPr lang="zh-CN" altLang="en-US"/>
           </a:p>
@@ -4306,7 +4312,7 @@
           <a:p>
             <a:fld id="{3ED37A20-15BF-40A6-9394-A94FB503F24D}" type="datetimeFigureOut">
               <a:rPr lang="zh-CN" altLang="en-US" smtClean="0"/>
-              <a:t>2021/4/28</a:t>
+              <a:t>2021/4/29</a:t>
             </a:fld>
             <a:endParaRPr lang="zh-CN" altLang="en-US"/>
           </a:p>
@@ -4569,7 +4575,7 @@
           <a:p>
             <a:fld id="{3ED37A20-15BF-40A6-9394-A94FB503F24D}" type="datetimeFigureOut">
               <a:rPr lang="zh-CN" altLang="en-US" smtClean="0"/>
-              <a:t>2021/4/28</a:t>
+              <a:t>2021/4/29</a:t>
             </a:fld>
             <a:endParaRPr lang="zh-CN" altLang="en-US"/>
           </a:p>
@@ -5312,7 +5318,7 @@
           <a:p>
             <a:fld id="{3ED37A20-15BF-40A6-9394-A94FB503F24D}" type="datetimeFigureOut">
               <a:rPr lang="zh-CN" altLang="en-US" smtClean="0"/>
-              <a:t>2021/4/28</a:t>
+              <a:t>2021/4/29</a:t>
             </a:fld>
             <a:endParaRPr lang="zh-CN" altLang="en-US"/>
           </a:p>
@@ -6038,7 +6044,7 @@
                 <a:effectLst/>
                 <a:ea typeface="Arial" panose="020B0604020202020204" pitchFamily="34" charset="0"/>
               </a:rPr>
-              <a:t>Jungkyu Kim</a:t>
+              <a:t>Felix Ogbodu</a:t>
             </a:r>
             <a:r>
               <a:rPr lang="en-US" altLang="zh-CN" dirty="0"/>
@@ -6051,7 +6057,7 @@
     </p:spTree>
     <p:extLst>
       <p:ext uri="{BB962C8B-B14F-4D97-AF65-F5344CB8AC3E}">
-        <p14:creationId xmlns:p14="http://schemas.microsoft.com/office/powerpoint/2010/main" val="3027793148"/>
+        <p14:creationId xmlns:p14="http://schemas.microsoft.com/office/powerpoint/2010/main" val="4260748630"/>
       </p:ext>
     </p:extLst>
   </p:cSld>
@@ -6096,14 +6102,12 @@
         </p:nvSpPr>
         <p:spPr/>
         <p:txBody>
-          <a:bodyPr>
-            <a:normAutofit/>
-          </a:bodyPr>
+          <a:bodyPr/>
           <a:lstStyle/>
           <a:p>
             <a:r>
               <a:rPr lang="en-US" altLang="zh-CN" dirty="0"/>
-              <a:t>Summary statistics </a:t>
+              <a:t>Graphing </a:t>
             </a:r>
             <a:endParaRPr lang="zh-CN" altLang="en-US" dirty="0"/>
           </a:p>
@@ -6173,11 +6177,11 @@
                 <a:effectLst/>
                 <a:ea typeface="Arial" panose="020B0604020202020204" pitchFamily="34" charset="0"/>
               </a:rPr>
-              <a:t>Riley Williamson</a:t>
+              <a:t>Jungkyu Kim</a:t>
             </a:r>
             <a:r>
               <a:rPr lang="en-US" altLang="zh-CN" dirty="0"/>
-              <a:t>  </a:t>
+              <a:t> </a:t>
             </a:r>
             <a:endParaRPr lang="zh-CN" altLang="en-US" dirty="0"/>
           </a:p>
@@ -6186,7 +6190,7 @@
     </p:spTree>
     <p:extLst>
       <p:ext uri="{BB962C8B-B14F-4D97-AF65-F5344CB8AC3E}">
-        <p14:creationId xmlns:p14="http://schemas.microsoft.com/office/powerpoint/2010/main" val="1748552998"/>
+        <p14:creationId xmlns:p14="http://schemas.microsoft.com/office/powerpoint/2010/main" val="3027793148"/>
       </p:ext>
     </p:extLst>
   </p:cSld>
@@ -6238,7 +6242,7 @@
           <a:p>
             <a:r>
               <a:rPr lang="en-US" altLang="zh-CN" dirty="0"/>
-              <a:t>P-test </a:t>
+              <a:t>Summary statistics </a:t>
             </a:r>
             <a:endParaRPr lang="zh-CN" altLang="en-US" dirty="0"/>
           </a:p>
@@ -6321,7 +6325,7 @@
     </p:spTree>
     <p:extLst>
       <p:ext uri="{BB962C8B-B14F-4D97-AF65-F5344CB8AC3E}">
-        <p14:creationId xmlns:p14="http://schemas.microsoft.com/office/powerpoint/2010/main" val="3699463610"/>
+        <p14:creationId xmlns:p14="http://schemas.microsoft.com/office/powerpoint/2010/main" val="1748552998"/>
       </p:ext>
     </p:extLst>
   </p:cSld>
@@ -6373,7 +6377,7 @@
           <a:p>
             <a:r>
               <a:rPr lang="en-US" altLang="zh-CN" dirty="0"/>
-              <a:t>Conclusion </a:t>
+              <a:t>P-test </a:t>
             </a:r>
             <a:endParaRPr lang="zh-CN" altLang="en-US" dirty="0"/>
           </a:p>
@@ -6448,6 +6452,141 @@
             <a:r>
               <a:rPr lang="en-US" altLang="zh-CN" dirty="0"/>
               <a:t>  </a:t>
+            </a:r>
+            <a:endParaRPr lang="zh-CN" altLang="en-US" dirty="0"/>
+          </a:p>
+        </p:txBody>
+      </p:sp>
+    </p:spTree>
+    <p:extLst>
+      <p:ext uri="{BB962C8B-B14F-4D97-AF65-F5344CB8AC3E}">
+        <p14:creationId xmlns:p14="http://schemas.microsoft.com/office/powerpoint/2010/main" val="3699463610"/>
+      </p:ext>
+    </p:extLst>
+  </p:cSld>
+  <p:clrMapOvr>
+    <a:masterClrMapping/>
+  </p:clrMapOvr>
+</p:sld>
+</file>
+
+<file path=ppt/slides/slide14.xml><?xml version="1.0" encoding="utf-8"?>
+<p:sld xmlns:a="http://schemas.openxmlformats.org/drawingml/2006/main" xmlns:r="http://schemas.openxmlformats.org/officeDocument/2006/relationships" xmlns:p="http://schemas.openxmlformats.org/presentationml/2006/main">
+  <p:cSld>
+    <p:spTree>
+      <p:nvGrpSpPr>
+        <p:cNvPr id="1" name=""/>
+        <p:cNvGrpSpPr/>
+        <p:nvPr/>
+      </p:nvGrpSpPr>
+      <p:grpSpPr>
+        <a:xfrm>
+          <a:off x="0" y="0"/>
+          <a:ext cx="0" cy="0"/>
+          <a:chOff x="0" y="0"/>
+          <a:chExt cx="0" cy="0"/>
+        </a:xfrm>
+      </p:grpSpPr>
+      <p:sp>
+        <p:nvSpPr>
+          <p:cNvPr id="2" name="Title 1">
+            <a:extLst>
+              <a:ext uri="{FF2B5EF4-FFF2-40B4-BE49-F238E27FC236}">
+                <a16:creationId xmlns:a16="http://schemas.microsoft.com/office/drawing/2014/main" id="{663D0643-9008-440B-801F-AF2816B5490B}"/>
+              </a:ext>
+            </a:extLst>
+          </p:cNvPr>
+          <p:cNvSpPr>
+            <a:spLocks noGrp="1"/>
+          </p:cNvSpPr>
+          <p:nvPr>
+            <p:ph type="title"/>
+          </p:nvPr>
+        </p:nvSpPr>
+        <p:spPr/>
+        <p:txBody>
+          <a:bodyPr>
+            <a:normAutofit/>
+          </a:bodyPr>
+          <a:lstStyle/>
+          <a:p>
+            <a:r>
+              <a:rPr lang="en-US" altLang="zh-CN" dirty="0"/>
+              <a:t>Conclusion </a:t>
+            </a:r>
+            <a:endParaRPr lang="zh-CN" altLang="en-US" dirty="0"/>
+          </a:p>
+        </p:txBody>
+      </p:sp>
+      <p:sp>
+        <p:nvSpPr>
+          <p:cNvPr id="3" name="Content Placeholder 2">
+            <a:extLst>
+              <a:ext uri="{FF2B5EF4-FFF2-40B4-BE49-F238E27FC236}">
+                <a16:creationId xmlns:a16="http://schemas.microsoft.com/office/drawing/2014/main" id="{4B3ECB60-0370-40E0-9495-4CCA3A7E9068}"/>
+              </a:ext>
+            </a:extLst>
+          </p:cNvPr>
+          <p:cNvSpPr>
+            <a:spLocks noGrp="1"/>
+          </p:cNvSpPr>
+          <p:nvPr>
+            <p:ph idx="1"/>
+          </p:nvPr>
+        </p:nvSpPr>
+        <p:spPr/>
+        <p:txBody>
+          <a:bodyPr>
+            <a:normAutofit/>
+          </a:bodyPr>
+          <a:lstStyle/>
+          <a:p>
+            <a:endParaRPr lang="zh-CN" altLang="en-US" dirty="0"/>
+          </a:p>
+        </p:txBody>
+      </p:sp>
+      <p:sp>
+        <p:nvSpPr>
+          <p:cNvPr id="7" name="TextBox 6">
+            <a:extLst>
+              <a:ext uri="{FF2B5EF4-FFF2-40B4-BE49-F238E27FC236}">
+                <a16:creationId xmlns:a16="http://schemas.microsoft.com/office/drawing/2014/main" id="{B784D723-236F-4355-AA3D-18C8B202159E}"/>
+              </a:ext>
+            </a:extLst>
+          </p:cNvPr>
+          <p:cNvSpPr txBox="1"/>
+          <p:nvPr/>
+        </p:nvSpPr>
+        <p:spPr>
+          <a:xfrm>
+            <a:off x="7076662" y="5910470"/>
+            <a:ext cx="3286538" cy="369332"/>
+          </a:xfrm>
+          <a:prstGeom prst="rect">
+            <a:avLst/>
+          </a:prstGeom>
+          <a:noFill/>
+        </p:spPr>
+        <p:txBody>
+          <a:bodyPr wrap="square" rtlCol="0">
+            <a:spAutoFit/>
+          </a:bodyPr>
+          <a:lstStyle/>
+          <a:p>
+            <a:r>
+              <a:rPr lang="en-US" altLang="zh-CN" dirty="0"/>
+              <a:t>By </a:t>
+            </a:r>
+            <a:r>
+              <a:rPr lang="zh-CN" altLang="zh-CN" sz="1800" dirty="0">
+                <a:effectLst/>
+                <a:ea typeface="Arial" panose="020B0604020202020204" pitchFamily="34" charset="0"/>
+              </a:rPr>
+              <a:t>Veera Supraja Koppisetty</a:t>
+            </a:r>
+            <a:r>
+              <a:rPr lang="en-US" altLang="zh-CN" dirty="0"/>
+              <a:t>   </a:t>
             </a:r>
             <a:endParaRPr lang="zh-CN" altLang="en-US" dirty="0"/>
           </a:p>
@@ -6532,23 +6671,23 @@
         <p:spPr/>
         <p:txBody>
           <a:bodyPr>
-            <a:normAutofit fontScale="85000" lnSpcReduction="20000"/>
+            <a:noAutofit/>
           </a:bodyPr>
           <a:lstStyle/>
           <a:p>
             <a:pPr algn="l"/>
             <a:r>
-              <a:rPr lang="en-US" altLang="zh-CN" dirty="0"/>
+              <a:rPr lang="en-US" altLang="zh-CN" sz="2000" dirty="0"/>
               <a:t>Group D1: </a:t>
             </a:r>
             <a:r>
-              <a:rPr lang="zh-CN" altLang="zh-CN" sz="1800" dirty="0">
+              <a:rPr lang="zh-CN" altLang="zh-CN" sz="2000" dirty="0">
                 <a:effectLst/>
                 <a:ea typeface="Arial" panose="020B0604020202020204" pitchFamily="34" charset="0"/>
               </a:rPr>
               <a:t>Jie Feng, Jungkyu Kim, Riley Williamson, Rodney Davemann,Veera Supraja Koppisetty, Felix Ogbodu</a:t>
             </a:r>
-            <a:endParaRPr lang="en-US" altLang="zh-CN" sz="1800" dirty="0">
+            <a:endParaRPr lang="en-US" altLang="zh-CN" sz="2000" dirty="0">
               <a:effectLst/>
               <a:ea typeface="Arial" panose="020B0604020202020204" pitchFamily="34" charset="0"/>
             </a:endParaRPr>
@@ -6556,30 +6695,37 @@
           <a:p>
             <a:pPr algn="l"/>
             <a:r>
-              <a:rPr lang="en-US" altLang="zh-CN" dirty="0"/>
+              <a:rPr lang="en-US" altLang="zh-CN" sz="2000" dirty="0"/>
               <a:t>Instructor: Thomas </a:t>
             </a:r>
             <a:r>
-              <a:rPr lang="en-US" altLang="zh-CN" dirty="0" err="1"/>
+              <a:rPr lang="en-US" altLang="zh-CN" sz="2000" dirty="0" err="1"/>
               <a:t>Raczkowski</a:t>
             </a:r>
-            <a:endParaRPr lang="en-US" altLang="zh-CN" dirty="0"/>
+            <a:endParaRPr lang="en-US" altLang="zh-CN" sz="2000" dirty="0"/>
           </a:p>
           <a:p>
             <a:pPr algn="l"/>
             <a:r>
-              <a:rPr lang="en-US" altLang="zh-CN" dirty="0"/>
+              <a:rPr lang="en-US" altLang="zh-CN" sz="2000" dirty="0"/>
               <a:t>TA: </a:t>
             </a:r>
             <a:r>
-              <a:rPr lang="en-US" altLang="zh-CN" dirty="0" err="1"/>
+              <a:rPr lang="en-US" altLang="zh-CN" sz="2000" dirty="0" err="1"/>
               <a:t>Sumit</a:t>
             </a:r>
             <a:r>
-              <a:rPr lang="en-US" altLang="zh-CN" dirty="0"/>
+              <a:rPr lang="en-US" altLang="zh-CN" sz="2000" dirty="0"/>
               <a:t> Malik</a:t>
             </a:r>
-            <a:endParaRPr lang="zh-CN" altLang="en-US" dirty="0"/>
+          </a:p>
+          <a:p>
+            <a:pPr algn="l"/>
+            <a:r>
+              <a:rPr lang="en-US" altLang="zh-CN" sz="2000" dirty="0"/>
+              <a:t>Date: 05/01/2021</a:t>
+            </a:r>
+            <a:endParaRPr lang="zh-CN" altLang="en-US" sz="2000" dirty="0"/>
           </a:p>
         </p:txBody>
       </p:sp>
@@ -7220,7 +7366,7 @@
                 <a:effectLst/>
                 <a:ea typeface="Arial" panose="020B0604020202020204" pitchFamily="34" charset="0"/>
               </a:rPr>
-              <a:t>Veera Supraja Koppisetty</a:t>
+              <a:t>Jungkyu Kim</a:t>
             </a:r>
             <a:r>
               <a:rPr lang="en-US" altLang="zh-CN" dirty="0"/>
@@ -7233,7 +7379,7 @@
     </p:spTree>
     <p:extLst>
       <p:ext uri="{BB962C8B-B14F-4D97-AF65-F5344CB8AC3E}">
-        <p14:creationId xmlns:p14="http://schemas.microsoft.com/office/powerpoint/2010/main" val="3210591287"/>
+        <p14:creationId xmlns:p14="http://schemas.microsoft.com/office/powerpoint/2010/main" val="3732807902"/>
       </p:ext>
     </p:extLst>
   </p:cSld>
@@ -7283,7 +7429,7 @@
           <a:p>
             <a:r>
               <a:rPr lang="en-US" altLang="zh-CN" dirty="0"/>
-              <a:t>Data cleaning </a:t>
+              <a:t>Data analysis </a:t>
             </a:r>
             <a:endParaRPr lang="zh-CN" altLang="en-US" dirty="0"/>
           </a:p>
@@ -7353,7 +7499,7 @@
                 <a:effectLst/>
                 <a:ea typeface="Arial" panose="020B0604020202020204" pitchFamily="34" charset="0"/>
               </a:rPr>
-              <a:t>Jungkyu Kim</a:t>
+              <a:t>Rodney Davemann</a:t>
             </a:r>
             <a:r>
               <a:rPr lang="en-US" altLang="zh-CN" dirty="0"/>
@@ -7366,7 +7512,7 @@
     </p:spTree>
     <p:extLst>
       <p:ext uri="{BB962C8B-B14F-4D97-AF65-F5344CB8AC3E}">
-        <p14:creationId xmlns:p14="http://schemas.microsoft.com/office/powerpoint/2010/main" val="3732807902"/>
+        <p14:creationId xmlns:p14="http://schemas.microsoft.com/office/powerpoint/2010/main" val="213444618"/>
       </p:ext>
     </p:extLst>
   </p:cSld>
@@ -7411,12 +7557,21 @@
         </p:nvSpPr>
         <p:spPr/>
         <p:txBody>
-          <a:bodyPr/>
+          <a:bodyPr>
+            <a:normAutofit fontScale="90000"/>
+          </a:bodyPr>
           <a:lstStyle/>
           <a:p>
             <a:r>
               <a:rPr lang="en-US" altLang="zh-CN" dirty="0"/>
-              <a:t>Data analysis </a:t>
+              <a:t>Data analysis</a:t>
+            </a:r>
+            <a:br>
+              <a:rPr lang="en-US" altLang="zh-CN" dirty="0"/>
+            </a:br>
+            <a:r>
+              <a:rPr lang="en-US" altLang="zh-CN" dirty="0"/>
+              <a:t>Question: How has Georgia been impacted? </a:t>
             </a:r>
             <a:endParaRPr lang="zh-CN" altLang="en-US" dirty="0"/>
           </a:p>
@@ -7444,6 +7599,130 @@
             <a:normAutofit/>
           </a:bodyPr>
           <a:lstStyle/>
+          <a:p>
+            <a:r>
+              <a:rPr lang="en-US" altLang="zh-CN" dirty="0"/>
+              <a:t>#get </a:t>
+            </a:r>
+            <a:r>
+              <a:rPr lang="en-US" altLang="zh-CN" dirty="0" err="1"/>
+              <a:t>georgia</a:t>
+            </a:r>
+            <a:r>
+              <a:rPr lang="en-US" altLang="zh-CN" dirty="0"/>
+              <a:t> data</a:t>
+            </a:r>
+          </a:p>
+          <a:p>
+            <a:r>
+              <a:rPr lang="en-US" altLang="zh-CN" dirty="0" err="1"/>
+              <a:t>georgia_data</a:t>
+            </a:r>
+            <a:r>
+              <a:rPr lang="en-US" altLang="zh-CN" dirty="0"/>
+              <a:t>=</a:t>
+            </a:r>
+            <a:r>
+              <a:rPr lang="en-US" altLang="zh-CN" dirty="0" err="1"/>
+              <a:t>merged_data.loc</a:t>
+            </a:r>
+            <a:r>
+              <a:rPr lang="en-US" altLang="zh-CN" dirty="0"/>
+              <a:t>[</a:t>
+            </a:r>
+            <a:r>
+              <a:rPr lang="en-US" altLang="zh-CN" dirty="0" err="1"/>
+              <a:t>merged_data</a:t>
+            </a:r>
+            <a:r>
+              <a:rPr lang="en-US" altLang="zh-CN" dirty="0"/>
+              <a:t>["state"]=="Georgia"]</a:t>
+            </a:r>
+          </a:p>
+          <a:p>
+            <a:r>
+              <a:rPr lang="en-US" altLang="zh-CN" dirty="0"/>
+              <a:t>#display </a:t>
+            </a:r>
+            <a:r>
+              <a:rPr lang="en-US" altLang="zh-CN" dirty="0" err="1"/>
+              <a:t>georgia</a:t>
+            </a:r>
+            <a:r>
+              <a:rPr lang="en-US" altLang="zh-CN" dirty="0"/>
+              <a:t> data</a:t>
+            </a:r>
+          </a:p>
+          <a:p>
+            <a:r>
+              <a:rPr lang="en-US" altLang="zh-CN" dirty="0"/>
+              <a:t>display(</a:t>
+            </a:r>
+            <a:r>
+              <a:rPr lang="en-US" altLang="zh-CN" dirty="0" err="1"/>
+              <a:t>georgia_data</a:t>
+            </a:r>
+            <a:r>
+              <a:rPr lang="en-US" altLang="zh-CN" dirty="0"/>
+              <a:t>)</a:t>
+            </a:r>
+          </a:p>
+          <a:p>
+            <a:r>
+              <a:rPr lang="en-US" altLang="zh-CN" dirty="0"/>
+              <a:t>#group </a:t>
+            </a:r>
+            <a:r>
+              <a:rPr lang="en-US" altLang="zh-CN" dirty="0" err="1"/>
+              <a:t>georgia</a:t>
+            </a:r>
+            <a:r>
+              <a:rPr lang="en-US" altLang="zh-CN" dirty="0"/>
+              <a:t> data by date</a:t>
+            </a:r>
+          </a:p>
+          <a:p>
+            <a:r>
+              <a:rPr lang="en-US" altLang="zh-CN" dirty="0" err="1"/>
+              <a:t>georgia_data_group_by_date</a:t>
+            </a:r>
+            <a:r>
+              <a:rPr lang="en-US" altLang="zh-CN" dirty="0"/>
+              <a:t>=</a:t>
+            </a:r>
+            <a:r>
+              <a:rPr lang="en-US" altLang="zh-CN" dirty="0" err="1"/>
+              <a:t>georgia_data.groupby</a:t>
+            </a:r>
+            <a:r>
+              <a:rPr lang="en-US" altLang="zh-CN" dirty="0"/>
+              <a:t>(["date"],sort=False)</a:t>
+            </a:r>
+          </a:p>
+          <a:p>
+            <a:r>
+              <a:rPr lang="en-US" altLang="zh-CN" dirty="0"/>
+              <a:t>#get the mean</a:t>
+            </a:r>
+          </a:p>
+          <a:p>
+            <a:r>
+              <a:rPr lang="en-US" altLang="zh-CN" dirty="0" err="1"/>
+              <a:t>georgia_data_group_by_date_mean</a:t>
+            </a:r>
+            <a:r>
+              <a:rPr lang="en-US" altLang="zh-CN" dirty="0"/>
+              <a:t>=</a:t>
+            </a:r>
+            <a:r>
+              <a:rPr lang="en-US" altLang="zh-CN" dirty="0" err="1"/>
+              <a:t>georgia_data_group_by_date.mean</a:t>
+            </a:r>
+            <a:r>
+              <a:rPr lang="en-US" altLang="zh-CN" dirty="0"/>
+              <a:t>()</a:t>
+            </a:r>
+          </a:p>
           <a:p>
             <a:endParaRPr lang="zh-CN" altLang="en-US" dirty="0"/>
           </a:p>
@@ -7463,7 +7742,7 @@
         </p:nvSpPr>
         <p:spPr>
           <a:xfrm>
-            <a:off x="7076662" y="5910470"/>
+            <a:off x="10024578" y="6251664"/>
             <a:ext cx="3286538" cy="369332"/>
           </a:xfrm>
           <a:prstGeom prst="rect">
@@ -7479,18 +7758,7 @@
           <a:p>
             <a:r>
               <a:rPr lang="en-US" altLang="zh-CN" dirty="0"/>
-              <a:t>By </a:t>
-            </a:r>
-            <a:r>
-              <a:rPr lang="zh-CN" altLang="zh-CN" sz="1800" dirty="0">
-                <a:effectLst/>
-                <a:ea typeface="Arial" panose="020B0604020202020204" pitchFamily="34" charset="0"/>
-              </a:rPr>
-              <a:t>Rodney Davemann</a:t>
-            </a:r>
-            <a:r>
-              <a:rPr lang="en-US" altLang="zh-CN" dirty="0"/>
-              <a:t> </a:t>
+              <a:t>By Jie Feng </a:t>
             </a:r>
             <a:endParaRPr lang="zh-CN" altLang="en-US" dirty="0"/>
           </a:p>
@@ -7499,7 +7767,7 @@
     </p:spTree>
     <p:extLst>
       <p:ext uri="{BB962C8B-B14F-4D97-AF65-F5344CB8AC3E}">
-        <p14:creationId xmlns:p14="http://schemas.microsoft.com/office/powerpoint/2010/main" val="213444618"/>
+        <p14:creationId xmlns:p14="http://schemas.microsoft.com/office/powerpoint/2010/main" val="408578972"/>
       </p:ext>
     </p:extLst>
   </p:cSld>
@@ -7531,7 +7799,7 @@
           <p:cNvPr id="2" name="Title 1">
             <a:extLst>
               <a:ext uri="{FF2B5EF4-FFF2-40B4-BE49-F238E27FC236}">
-                <a16:creationId xmlns:a16="http://schemas.microsoft.com/office/drawing/2014/main" id="{663D0643-9008-440B-801F-AF2816B5490B}"/>
+                <a16:creationId xmlns:a16="http://schemas.microsoft.com/office/drawing/2014/main" id="{51590284-CCD1-4060-A489-50D88FBE5A03}"/>
               </a:ext>
             </a:extLst>
           </p:cNvPr>
@@ -7544,50 +7812,140 @@
         </p:nvSpPr>
         <p:spPr/>
         <p:txBody>
-          <a:bodyPr/>
+          <a:bodyPr>
+            <a:normAutofit fontScale="90000"/>
+          </a:bodyPr>
           <a:lstStyle/>
           <a:p>
             <a:r>
               <a:rPr lang="en-US" altLang="zh-CN" dirty="0"/>
-              <a:t>Data analysis </a:t>
+              <a:t>Data analysis</a:t>
+            </a:r>
+            <a:br>
+              <a:rPr lang="en-US" altLang="zh-CN" dirty="0"/>
+            </a:br>
+            <a:r>
+              <a:rPr lang="en-US" altLang="zh-CN" dirty="0"/>
+              <a:t>Question: How has Georgia been impacted? </a:t>
             </a:r>
             <a:endParaRPr lang="zh-CN" altLang="en-US" dirty="0"/>
           </a:p>
         </p:txBody>
       </p:sp>
-      <p:sp>
-        <p:nvSpPr>
-          <p:cNvPr id="3" name="Content Placeholder 2">
+      <p:pic>
+        <p:nvPicPr>
+          <p:cNvPr id="14" name="Picture 13" descr="Chart, histogram&#10;&#10;Description automatically generated">
             <a:extLst>
               <a:ext uri="{FF2B5EF4-FFF2-40B4-BE49-F238E27FC236}">
-                <a16:creationId xmlns:a16="http://schemas.microsoft.com/office/drawing/2014/main" id="{4B3ECB60-0370-40E0-9495-4CCA3A7E9068}"/>
+                <a16:creationId xmlns:a16="http://schemas.microsoft.com/office/drawing/2014/main" id="{D5E6BB94-062B-428A-A1A2-BB47BA987EF3}"/>
               </a:ext>
             </a:extLst>
           </p:cNvPr>
-          <p:cNvSpPr>
-            <a:spLocks noGrp="1"/>
-          </p:cNvSpPr>
-          <p:nvPr>
-            <p:ph idx="1"/>
-          </p:nvPr>
-        </p:nvSpPr>
-        <p:spPr/>
-        <p:txBody>
-          <a:bodyPr>
-            <a:normAutofit/>
-          </a:bodyPr>
-          <a:lstStyle/>
-          <a:p>
-            <a:endParaRPr lang="zh-CN" altLang="en-US" dirty="0"/>
-          </a:p>
-        </p:txBody>
-      </p:sp>
-      <p:sp>
-        <p:nvSpPr>
-          <p:cNvPr id="7" name="TextBox 6">
+          <p:cNvPicPr>
+            <a:picLocks noChangeAspect="1"/>
+          </p:cNvPicPr>
+          <p:nvPr/>
+        </p:nvPicPr>
+        <p:blipFill>
+          <a:blip r:embed="rId2">
+            <a:extLst>
+              <a:ext uri="{28A0092B-C50C-407E-A947-70E740481C1C}">
+                <a14:useLocalDpi xmlns:a14="http://schemas.microsoft.com/office/drawing/2010/main" val="0"/>
+              </a:ext>
+            </a:extLst>
+          </a:blip>
+          <a:stretch>
+            <a:fillRect/>
+          </a:stretch>
+        </p:blipFill>
+        <p:spPr>
+          <a:xfrm>
+            <a:off x="35417" y="2293748"/>
+            <a:ext cx="3694176" cy="3694176"/>
+          </a:xfrm>
+          <a:prstGeom prst="rect">
+            <a:avLst/>
+          </a:prstGeom>
+        </p:spPr>
+      </p:pic>
+      <p:pic>
+        <p:nvPicPr>
+          <p:cNvPr id="16" name="Picture 15" descr="Chart, histogram&#10;&#10;Description automatically generated">
             <a:extLst>
               <a:ext uri="{FF2B5EF4-FFF2-40B4-BE49-F238E27FC236}">
-                <a16:creationId xmlns:a16="http://schemas.microsoft.com/office/drawing/2014/main" id="{B784D723-236F-4355-AA3D-18C8B202159E}"/>
+                <a16:creationId xmlns:a16="http://schemas.microsoft.com/office/drawing/2014/main" id="{3417B815-0FF6-4544-991F-5B3F0B7A599D}"/>
+              </a:ext>
+            </a:extLst>
+          </p:cNvPr>
+          <p:cNvPicPr>
+            <a:picLocks noChangeAspect="1"/>
+          </p:cNvPicPr>
+          <p:nvPr/>
+        </p:nvPicPr>
+        <p:blipFill>
+          <a:blip r:embed="rId3">
+            <a:extLst>
+              <a:ext uri="{28A0092B-C50C-407E-A947-70E740481C1C}">
+                <a14:useLocalDpi xmlns:a14="http://schemas.microsoft.com/office/drawing/2010/main" val="0"/>
+              </a:ext>
+            </a:extLst>
+          </a:blip>
+          <a:stretch>
+            <a:fillRect/>
+          </a:stretch>
+        </p:blipFill>
+        <p:spPr>
+          <a:xfrm>
+            <a:off x="4263315" y="2293748"/>
+            <a:ext cx="3694176" cy="3694176"/>
+          </a:xfrm>
+          <a:prstGeom prst="rect">
+            <a:avLst/>
+          </a:prstGeom>
+        </p:spPr>
+      </p:pic>
+      <p:pic>
+        <p:nvPicPr>
+          <p:cNvPr id="18" name="Picture 17" descr="Chart, bar chart, histogram&#10;&#10;Description automatically generated">
+            <a:extLst>
+              <a:ext uri="{FF2B5EF4-FFF2-40B4-BE49-F238E27FC236}">
+                <a16:creationId xmlns:a16="http://schemas.microsoft.com/office/drawing/2014/main" id="{EEF20B85-5BF3-461D-AB18-EE10250BF266}"/>
+              </a:ext>
+            </a:extLst>
+          </p:cNvPr>
+          <p:cNvPicPr>
+            <a:picLocks noChangeAspect="1"/>
+          </p:cNvPicPr>
+          <p:nvPr/>
+        </p:nvPicPr>
+        <p:blipFill>
+          <a:blip r:embed="rId4">
+            <a:extLst>
+              <a:ext uri="{28A0092B-C50C-407E-A947-70E740481C1C}">
+                <a14:useLocalDpi xmlns:a14="http://schemas.microsoft.com/office/drawing/2010/main" val="0"/>
+              </a:ext>
+            </a:extLst>
+          </a:blip>
+          <a:stretch>
+            <a:fillRect/>
+          </a:stretch>
+        </p:blipFill>
+        <p:spPr>
+          <a:xfrm>
+            <a:off x="8307087" y="2493936"/>
+            <a:ext cx="3694176" cy="3694176"/>
+          </a:xfrm>
+          <a:prstGeom prst="rect">
+            <a:avLst/>
+          </a:prstGeom>
+        </p:spPr>
+      </p:pic>
+      <p:sp>
+        <p:nvSpPr>
+          <p:cNvPr id="6" name="TextBox 5">
+            <a:extLst>
+              <a:ext uri="{FF2B5EF4-FFF2-40B4-BE49-F238E27FC236}">
+                <a16:creationId xmlns:a16="http://schemas.microsoft.com/office/drawing/2014/main" id="{7FBBA0C9-2AA7-415F-8C77-0000045E2016}"/>
               </a:ext>
             </a:extLst>
           </p:cNvPr>
@@ -7596,7 +7954,7 @@
         </p:nvSpPr>
         <p:spPr>
           <a:xfrm>
-            <a:off x="7076662" y="5910470"/>
+            <a:off x="10141324" y="6382316"/>
             <a:ext cx="3286538" cy="369332"/>
           </a:xfrm>
           <a:prstGeom prst="rect">
@@ -7621,7 +7979,7 @@
     </p:spTree>
     <p:extLst>
       <p:ext uri="{BB962C8B-B14F-4D97-AF65-F5344CB8AC3E}">
-        <p14:creationId xmlns:p14="http://schemas.microsoft.com/office/powerpoint/2010/main" val="408578972"/>
+        <p14:creationId xmlns:p14="http://schemas.microsoft.com/office/powerpoint/2010/main" val="865997246"/>
       </p:ext>
     </p:extLst>
   </p:cSld>
@@ -7650,66 +8008,197 @@
       </p:grpSpPr>
       <p:sp>
         <p:nvSpPr>
-          <p:cNvPr id="2" name="Title 1">
+          <p:cNvPr id="3" name="Title 1">
             <a:extLst>
               <a:ext uri="{FF2B5EF4-FFF2-40B4-BE49-F238E27FC236}">
-                <a16:creationId xmlns:a16="http://schemas.microsoft.com/office/drawing/2014/main" id="{663D0643-9008-440B-801F-AF2816B5490B}"/>
+                <a16:creationId xmlns:a16="http://schemas.microsoft.com/office/drawing/2014/main" id="{22C44EDA-8B51-4668-9B61-4846E6A890DC}"/>
               </a:ext>
             </a:extLst>
           </p:cNvPr>
-          <p:cNvSpPr>
-            <a:spLocks noGrp="1"/>
-          </p:cNvSpPr>
-          <p:nvPr>
-            <p:ph type="title"/>
-          </p:nvPr>
-        </p:nvSpPr>
-        <p:spPr/>
-        <p:txBody>
-          <a:bodyPr/>
-          <a:lstStyle/>
-          <a:p>
-            <a:r>
-              <a:rPr lang="en-US" altLang="zh-CN" dirty="0"/>
-              <a:t>Graphing </a:t>
+          <p:cNvSpPr txBox="1">
+            <a:spLocks/>
+          </p:cNvSpPr>
+          <p:nvPr/>
+        </p:nvSpPr>
+        <p:spPr>
+          <a:xfrm>
+            <a:off x="829734" y="147850"/>
+            <a:ext cx="8596668" cy="1320800"/>
+          </a:xfrm>
+          <a:prstGeom prst="rect">
+            <a:avLst/>
+          </a:prstGeom>
+        </p:spPr>
+        <p:txBody>
+          <a:bodyPr vert="horz" lIns="91440" tIns="45720" rIns="91440" bIns="45720" rtlCol="0" anchor="t">
+            <a:normAutofit fontScale="90000"/>
+          </a:bodyPr>
+          <a:lstStyle>
+            <a:lvl1pPr algn="l" defTabSz="457200" rtl="0" eaLnBrk="1" latinLnBrk="0" hangingPunct="1">
+              <a:spcBef>
+                <a:spcPct val="0"/>
+              </a:spcBef>
+              <a:buNone/>
+              <a:defRPr sz="3600" kern="1200">
+                <a:solidFill>
+                  <a:schemeClr val="accent1"/>
+                </a:solidFill>
+                <a:latin typeface="+mj-lt"/>
+                <a:ea typeface="+mj-ea"/>
+                <a:cs typeface="+mj-cs"/>
+              </a:defRPr>
+            </a:lvl1pPr>
+            <a:lvl2pPr eaLnBrk="1" hangingPunct="1">
+              <a:defRPr>
+                <a:solidFill>
+                  <a:schemeClr val="tx2"/>
+                </a:solidFill>
+              </a:defRPr>
+            </a:lvl2pPr>
+            <a:lvl3pPr eaLnBrk="1" hangingPunct="1">
+              <a:defRPr>
+                <a:solidFill>
+                  <a:schemeClr val="tx2"/>
+                </a:solidFill>
+              </a:defRPr>
+            </a:lvl3pPr>
+            <a:lvl4pPr eaLnBrk="1" hangingPunct="1">
+              <a:defRPr>
+                <a:solidFill>
+                  <a:schemeClr val="tx2"/>
+                </a:solidFill>
+              </a:defRPr>
+            </a:lvl4pPr>
+            <a:lvl5pPr eaLnBrk="1" hangingPunct="1">
+              <a:defRPr>
+                <a:solidFill>
+                  <a:schemeClr val="tx2"/>
+                </a:solidFill>
+              </a:defRPr>
+            </a:lvl5pPr>
+            <a:lvl6pPr eaLnBrk="1" hangingPunct="1">
+              <a:defRPr>
+                <a:solidFill>
+                  <a:schemeClr val="tx2"/>
+                </a:solidFill>
+              </a:defRPr>
+            </a:lvl6pPr>
+            <a:lvl7pPr eaLnBrk="1" hangingPunct="1">
+              <a:defRPr>
+                <a:solidFill>
+                  <a:schemeClr val="tx2"/>
+                </a:solidFill>
+              </a:defRPr>
+            </a:lvl7pPr>
+            <a:lvl8pPr eaLnBrk="1" hangingPunct="1">
+              <a:defRPr>
+                <a:solidFill>
+                  <a:schemeClr val="tx2"/>
+                </a:solidFill>
+              </a:defRPr>
+            </a:lvl8pPr>
+            <a:lvl9pPr eaLnBrk="1" hangingPunct="1">
+              <a:defRPr>
+                <a:solidFill>
+                  <a:schemeClr val="tx2"/>
+                </a:solidFill>
+              </a:defRPr>
+            </a:lvl9pPr>
+          </a:lstStyle>
+          <a:p>
+            <a:r>
+              <a:rPr lang="en-US" altLang="zh-CN"/>
+              <a:t>Data analysis</a:t>
+            </a:r>
+            <a:br>
+              <a:rPr lang="en-US" altLang="zh-CN"/>
+            </a:br>
+            <a:r>
+              <a:rPr lang="en-US" altLang="zh-CN"/>
+              <a:t>Question: How has Georgia been impacted? </a:t>
             </a:r>
             <a:endParaRPr lang="zh-CN" altLang="en-US" dirty="0"/>
           </a:p>
         </p:txBody>
       </p:sp>
-      <p:sp>
-        <p:nvSpPr>
-          <p:cNvPr id="3" name="Content Placeholder 2">
+      <p:pic>
+        <p:nvPicPr>
+          <p:cNvPr id="5" name="Picture 4" descr="Chart, scatter chart&#10;&#10;Description automatically generated">
             <a:extLst>
               <a:ext uri="{FF2B5EF4-FFF2-40B4-BE49-F238E27FC236}">
-                <a16:creationId xmlns:a16="http://schemas.microsoft.com/office/drawing/2014/main" id="{4B3ECB60-0370-40E0-9495-4CCA3A7E9068}"/>
+                <a16:creationId xmlns:a16="http://schemas.microsoft.com/office/drawing/2014/main" id="{39F05766-B02A-44A1-BBAD-B95C879A62FA}"/>
               </a:ext>
             </a:extLst>
           </p:cNvPr>
-          <p:cNvSpPr>
-            <a:spLocks noGrp="1"/>
-          </p:cNvSpPr>
-          <p:nvPr>
-            <p:ph idx="1"/>
-          </p:nvPr>
-        </p:nvSpPr>
-        <p:spPr/>
-        <p:txBody>
-          <a:bodyPr>
-            <a:normAutofit/>
-          </a:bodyPr>
-          <a:lstStyle/>
-          <a:p>
-            <a:endParaRPr lang="zh-CN" altLang="en-US" dirty="0"/>
-          </a:p>
-        </p:txBody>
-      </p:sp>
-      <p:sp>
-        <p:nvSpPr>
-          <p:cNvPr id="7" name="TextBox 6">
+          <p:cNvPicPr>
+            <a:picLocks noChangeAspect="1"/>
+          </p:cNvPicPr>
+          <p:nvPr/>
+        </p:nvPicPr>
+        <p:blipFill>
+          <a:blip r:embed="rId2">
+            <a:extLst>
+              <a:ext uri="{28A0092B-C50C-407E-A947-70E740481C1C}">
+                <a14:useLocalDpi xmlns:a14="http://schemas.microsoft.com/office/drawing/2010/main" val="0"/>
+              </a:ext>
+            </a:extLst>
+          </a:blip>
+          <a:stretch>
+            <a:fillRect/>
+          </a:stretch>
+        </p:blipFill>
+        <p:spPr>
+          <a:xfrm>
+            <a:off x="194243" y="1534686"/>
+            <a:ext cx="5852172" cy="4389129"/>
+          </a:xfrm>
+          <a:prstGeom prst="rect">
+            <a:avLst/>
+          </a:prstGeom>
+        </p:spPr>
+      </p:pic>
+      <p:pic>
+        <p:nvPicPr>
+          <p:cNvPr id="7" name="Picture 6" descr="Chart, scatter chart&#10;&#10;Description automatically generated">
             <a:extLst>
               <a:ext uri="{FF2B5EF4-FFF2-40B4-BE49-F238E27FC236}">
-                <a16:creationId xmlns:a16="http://schemas.microsoft.com/office/drawing/2014/main" id="{B784D723-236F-4355-AA3D-18C8B202159E}"/>
+                <a16:creationId xmlns:a16="http://schemas.microsoft.com/office/drawing/2014/main" id="{E7EF0255-F83B-471D-BAB7-6D385CD67537}"/>
+              </a:ext>
+            </a:extLst>
+          </p:cNvPr>
+          <p:cNvPicPr>
+            <a:picLocks noChangeAspect="1"/>
+          </p:cNvPicPr>
+          <p:nvPr/>
+        </p:nvPicPr>
+        <p:blipFill>
+          <a:blip r:embed="rId3">
+            <a:extLst>
+              <a:ext uri="{28A0092B-C50C-407E-A947-70E740481C1C}">
+                <a14:useLocalDpi xmlns:a14="http://schemas.microsoft.com/office/drawing/2010/main" val="0"/>
+              </a:ext>
+            </a:extLst>
+          </a:blip>
+          <a:stretch>
+            <a:fillRect/>
+          </a:stretch>
+        </p:blipFill>
+        <p:spPr>
+          <a:xfrm>
+            <a:off x="6161083" y="1534684"/>
+            <a:ext cx="5852172" cy="4389129"/>
+          </a:xfrm>
+          <a:prstGeom prst="rect">
+            <a:avLst/>
+          </a:prstGeom>
+        </p:spPr>
+      </p:pic>
+      <p:sp>
+        <p:nvSpPr>
+          <p:cNvPr id="9" name="TextBox 8">
+            <a:extLst>
+              <a:ext uri="{FF2B5EF4-FFF2-40B4-BE49-F238E27FC236}">
+                <a16:creationId xmlns:a16="http://schemas.microsoft.com/office/drawing/2014/main" id="{6A110733-42D9-4E2B-B71E-48B14192C0FB}"/>
               </a:ext>
             </a:extLst>
           </p:cNvPr>
@@ -7718,7 +8207,79 @@
         </p:nvSpPr>
         <p:spPr>
           <a:xfrm>
-            <a:off x="7076662" y="5910470"/>
+            <a:off x="1033670" y="5923813"/>
+            <a:ext cx="2188420" cy="369332"/>
+          </a:xfrm>
+          <a:prstGeom prst="rect">
+            <a:avLst/>
+          </a:prstGeom>
+          <a:noFill/>
+        </p:spPr>
+        <p:txBody>
+          <a:bodyPr wrap="none" rtlCol="0">
+            <a:spAutoFit/>
+          </a:bodyPr>
+          <a:lstStyle/>
+          <a:p>
+            <a:r>
+              <a:rPr lang="en-US" altLang="zh-CN" dirty="0"/>
+              <a:t>The r value is 0.04.</a:t>
+            </a:r>
+            <a:endParaRPr lang="zh-CN" altLang="en-US" dirty="0"/>
+          </a:p>
+        </p:txBody>
+      </p:sp>
+      <p:sp>
+        <p:nvSpPr>
+          <p:cNvPr id="10" name="TextBox 9">
+            <a:extLst>
+              <a:ext uri="{FF2B5EF4-FFF2-40B4-BE49-F238E27FC236}">
+                <a16:creationId xmlns:a16="http://schemas.microsoft.com/office/drawing/2014/main" id="{F0E84953-112D-44E6-BD5C-B9DE845A6316}"/>
+              </a:ext>
+            </a:extLst>
+          </p:cNvPr>
+          <p:cNvSpPr txBox="1"/>
+          <p:nvPr/>
+        </p:nvSpPr>
+        <p:spPr>
+          <a:xfrm>
+            <a:off x="8302497" y="5943693"/>
+            <a:ext cx="2188420" cy="369332"/>
+          </a:xfrm>
+          <a:prstGeom prst="rect">
+            <a:avLst/>
+          </a:prstGeom>
+          <a:noFill/>
+        </p:spPr>
+        <p:txBody>
+          <a:bodyPr wrap="none" rtlCol="0">
+            <a:spAutoFit/>
+          </a:bodyPr>
+          <a:lstStyle/>
+          <a:p>
+            <a:r>
+              <a:rPr lang="en-US" altLang="zh-CN" dirty="0"/>
+              <a:t>The r value is 0.04.</a:t>
+            </a:r>
+            <a:endParaRPr lang="zh-CN" altLang="en-US" dirty="0"/>
+          </a:p>
+        </p:txBody>
+      </p:sp>
+      <p:sp>
+        <p:nvSpPr>
+          <p:cNvPr id="8" name="TextBox 7">
+            <a:extLst>
+              <a:ext uri="{FF2B5EF4-FFF2-40B4-BE49-F238E27FC236}">
+                <a16:creationId xmlns:a16="http://schemas.microsoft.com/office/drawing/2014/main" id="{CAD25CCB-9AC0-4810-A064-FADF062CC0BD}"/>
+              </a:ext>
+            </a:extLst>
+          </p:cNvPr>
+          <p:cNvSpPr txBox="1"/>
+          <p:nvPr/>
+        </p:nvSpPr>
+        <p:spPr>
+          <a:xfrm>
+            <a:off x="10172723" y="6428779"/>
             <a:ext cx="3286538" cy="369332"/>
           </a:xfrm>
           <a:prstGeom prst="rect">
@@ -7734,18 +8295,7 @@
           <a:p>
             <a:r>
               <a:rPr lang="en-US" altLang="zh-CN" dirty="0"/>
-              <a:t>By </a:t>
-            </a:r>
-            <a:r>
-              <a:rPr lang="zh-CN" altLang="zh-CN" sz="1800" dirty="0">
-                <a:effectLst/>
-                <a:ea typeface="Arial" panose="020B0604020202020204" pitchFamily="34" charset="0"/>
-              </a:rPr>
-              <a:t>Felix Ogbodu</a:t>
-            </a:r>
-            <a:r>
-              <a:rPr lang="en-US" altLang="zh-CN" dirty="0"/>
-              <a:t> </a:t>
+              <a:t>By Jie Feng </a:t>
             </a:r>
             <a:endParaRPr lang="zh-CN" altLang="en-US" dirty="0"/>
           </a:p>
@@ -7754,7 +8304,7 @@
     </p:spTree>
     <p:extLst>
       <p:ext uri="{BB962C8B-B14F-4D97-AF65-F5344CB8AC3E}">
-        <p14:creationId xmlns:p14="http://schemas.microsoft.com/office/powerpoint/2010/main" val="4260748630"/>
+        <p14:creationId xmlns:p14="http://schemas.microsoft.com/office/powerpoint/2010/main" val="2261705071"/>
       </p:ext>
     </p:extLst>
   </p:cSld>

</xml_diff>